<commit_message>
Upd docker info cmds, Node and Express information
</commit_message>
<xml_diff>
--- a/05_es6_node/NodeJS_demo/02_nodejs/Express_and_middleware.pptx
+++ b/05_es6_node/NodeJS_demo/02_nodejs/Express_and_middleware.pptx
@@ -1682,7 +1682,7 @@
           <a:p>
             <a:fld id="{5645C365-1C26-6946-87AF-75D6A7DF4277}" type="datetimeFigureOut">
               <a:rPr lang="en-GB" smtClean="0"/>
-              <a:t>10/02/2023</a:t>
+              <a:t>23/10/2024</a:t>
             </a:fld>
             <a:endParaRPr lang="en-GB"/>
           </a:p>
@@ -2181,7 +2181,7 @@
           <a:p>
             <a:fld id="{35B864B8-8D08-7B43-B4FB-B2FB41A5D9E3}" type="datetime1">
               <a:rPr lang="fi-FI" smtClean="0"/>
-              <a:t>10.2.2023</a:t>
+              <a:t>23.10.2024</a:t>
             </a:fld>
             <a:endParaRPr lang="en-GB" dirty="0"/>
           </a:p>
@@ -2508,7 +2508,7 @@
           <a:p>
             <a:fld id="{D5AEA85A-FC56-D34C-9AA6-ECC3D2586F37}" type="datetime1">
               <a:rPr lang="fi-FI" smtClean="0"/>
-              <a:t>10.2.2023</a:t>
+              <a:t>23.10.2024</a:t>
             </a:fld>
             <a:endParaRPr lang="en-GB" dirty="0"/>
           </a:p>
@@ -2718,7 +2718,7 @@
           <a:p>
             <a:fld id="{E6BC6EEF-E660-7844-8930-418AFF95EA40}" type="datetime1">
               <a:rPr lang="fi-FI" smtClean="0"/>
-              <a:t>10.2.2023</a:t>
+              <a:t>23.10.2024</a:t>
             </a:fld>
             <a:endParaRPr lang="en-GB" dirty="0"/>
           </a:p>
@@ -3027,7 +3027,7 @@
           <a:p>
             <a:fld id="{4E10C7EC-C1C1-9849-A573-7692478FCD52}" type="datetime1">
               <a:rPr lang="fi-FI" smtClean="0"/>
-              <a:t>10.2.2023</a:t>
+              <a:t>23.10.2024</a:t>
             </a:fld>
             <a:endParaRPr lang="en-GB" dirty="0"/>
           </a:p>
@@ -3300,7 +3300,7 @@
           <a:p>
             <a:fld id="{844FF3FE-30BE-2040-9151-6FBC4992BF4F}" type="datetime1">
               <a:rPr lang="fi-FI" smtClean="0"/>
-              <a:t>10.2.2023</a:t>
+              <a:t>23.10.2024</a:t>
             </a:fld>
             <a:endParaRPr lang="en-GB" dirty="0"/>
           </a:p>
@@ -3540,7 +3540,7 @@
           <a:p>
             <a:fld id="{11EDCD7B-6966-E249-89F2-D46BDFBF56BE}" type="datetime1">
               <a:rPr lang="fi-FI" smtClean="0"/>
-              <a:t>10.2.2023</a:t>
+              <a:t>23.10.2024</a:t>
             </a:fld>
             <a:endParaRPr lang="en-GB" dirty="0"/>
           </a:p>
@@ -3833,7 +3833,7 @@
           <a:p>
             <a:fld id="{11EDCD7B-6966-E249-89F2-D46BDFBF56BE}" type="datetime1">
               <a:rPr lang="fi-FI" smtClean="0"/>
-              <a:t>10.2.2023</a:t>
+              <a:t>23.10.2024</a:t>
             </a:fld>
             <a:endParaRPr lang="en-GB" dirty="0"/>
           </a:p>
@@ -4272,7 +4272,7 @@
           <a:p>
             <a:fld id="{844FF3FE-30BE-2040-9151-6FBC4992BF4F}" type="datetime1">
               <a:rPr lang="fi-FI" smtClean="0"/>
-              <a:t>10.2.2023</a:t>
+              <a:t>23.10.2024</a:t>
             </a:fld>
             <a:endParaRPr lang="en-GB" dirty="0"/>
           </a:p>
@@ -4500,7 +4500,7 @@
           <a:p>
             <a:fld id="{11EDCD7B-6966-E249-89F2-D46BDFBF56BE}" type="datetime1">
               <a:rPr lang="fi-FI" smtClean="0"/>
-              <a:t>10.2.2023</a:t>
+              <a:t>23.10.2024</a:t>
             </a:fld>
             <a:endParaRPr lang="en-GB" dirty="0"/>
           </a:p>
@@ -4915,7 +4915,7 @@
           <a:p>
             <a:fld id="{B62E192A-D52B-F541-B2AA-4AEB9388F1F7}" type="datetime1">
               <a:rPr lang="fi-FI" smtClean="0"/>
-              <a:t>10.2.2023</a:t>
+              <a:t>23.10.2024</a:t>
             </a:fld>
             <a:endParaRPr lang="en-GB" dirty="0"/>
           </a:p>
@@ -5215,7 +5215,7 @@
           <a:p>
             <a:fld id="{EEA4FAA2-2B3E-264C-A42F-2D6D3EF33A3C}" type="datetime1">
               <a:rPr lang="fi-FI" smtClean="0"/>
-              <a:t>10.2.2023</a:t>
+              <a:t>23.10.2024</a:t>
             </a:fld>
             <a:endParaRPr lang="en-GB" dirty="0"/>
           </a:p>
@@ -6118,7 +6118,7 @@
           <a:p>
             <a:fld id="{B3114A65-8017-1743-A85A-B2A4BB835AE9}" type="datetime1">
               <a:rPr lang="fi-FI" smtClean="0"/>
-              <a:t>10.2.2023</a:t>
+              <a:t>23.10.2024</a:t>
             </a:fld>
             <a:endParaRPr lang="en-GB" dirty="0"/>
           </a:p>
@@ -6346,7 +6346,7 @@
           <a:p>
             <a:fld id="{11EDCD7B-6966-E249-89F2-D46BDFBF56BE}" type="datetime1">
               <a:rPr lang="fi-FI" smtClean="0"/>
-              <a:t>10.2.2023</a:t>
+              <a:t>23.10.2024</a:t>
             </a:fld>
             <a:endParaRPr lang="en-GB" dirty="0"/>
           </a:p>
@@ -6638,7 +6638,7 @@
           <a:p>
             <a:fld id="{45F98643-D206-614D-B596-3C8548138211}" type="datetime1">
               <a:rPr lang="fi-FI" smtClean="0"/>
-              <a:t>10.2.2023</a:t>
+              <a:t>23.10.2024</a:t>
             </a:fld>
             <a:endParaRPr lang="en-GB" dirty="0"/>
           </a:p>
@@ -7088,7 +7088,7 @@
       </a:lvl9pPr>
     </p:otherStyle>
   </p:txStyles>
-  <p:extLst mod="1">
+  <p:extLst>
     <p:ext uri="{27BBF7A9-308A-43DC-89C8-2F10F3537804}">
       <p15:sldGuideLst xmlns:p15="http://schemas.microsoft.com/office/powerpoint/2012/main">
         <p15:guide id="1" orient="horz" pos="2160" userDrawn="1">
@@ -7255,7 +7255,7 @@
           <a:p>
             <a:r>
               <a:rPr lang="en-GB" dirty="0"/>
-              <a:t>idea-case-backend demo</a:t>
+              <a:t>backend demo</a:t>
             </a:r>
           </a:p>
         </p:txBody>
@@ -7283,7 +7283,7 @@
           <a:p>
             <a:fld id="{30BF63A1-919F-FB49-ABA8-182126D24C50}" type="datetime1">
               <a:rPr lang="fi-FI" smtClean="0"/>
-              <a:t>10.2.2023</a:t>
+              <a:t>23.10.2024</a:t>
             </a:fld>
             <a:endParaRPr lang="en-GB" dirty="0"/>
           </a:p>
@@ -7371,8 +7371,12 @@
           <a:lstStyle/>
           <a:p>
             <a:r>
-              <a:rPr lang="fi-FI" dirty="0"/>
-              <a:t>Express </a:t>
+              <a:rPr lang="fi-FI" i="1" dirty="0"/>
+              <a:t>Express</a:t>
+            </a:r>
+            <a:r>
+              <a:rPr lang="fi-FI" dirty="0"/>
+              <a:t> </a:t>
             </a:r>
             <a:r>
               <a:rPr lang="fi-FI" dirty="0" err="1"/>
@@ -7456,7 +7460,7 @@
             </a:r>
             <a:r>
               <a:rPr lang="fi-FI" dirty="0"/>
-              <a:t> =&gt; Express </a:t>
+              <a:t> =&gt; (Express </a:t>
             </a:r>
             <a:r>
               <a:rPr lang="fi-FI" dirty="0" err="1"/>
@@ -7520,40 +7524,44 @@
             </a:r>
             <a:r>
               <a:rPr lang="fi-FI" dirty="0"/>
-              <a:t>.</a:t>
-            </a:r>
-          </a:p>
-          <a:p>
-            <a:r>
-              <a:rPr lang="fi-FI" dirty="0"/>
-              <a:t>”Write </a:t>
-            </a:r>
-            <a:r>
-              <a:rPr lang="fi-FI" dirty="0" err="1"/>
+              <a:t>.)</a:t>
+            </a:r>
+          </a:p>
+          <a:p>
+            <a:r>
+              <a:rPr lang="fi-FI" dirty="0"/>
+              <a:t>”</a:t>
+            </a:r>
+            <a:r>
+              <a:rPr lang="fi-FI" i="1" dirty="0"/>
+              <a:t>Write </a:t>
+            </a:r>
+            <a:r>
+              <a:rPr lang="fi-FI" i="1" dirty="0" err="1"/>
               <a:t>less</a:t>
             </a:r>
             <a:r>
-              <a:rPr lang="fi-FI" dirty="0"/>
+              <a:rPr lang="fi-FI" i="1" dirty="0"/>
               <a:t> and </a:t>
             </a:r>
             <a:r>
-              <a:rPr lang="fi-FI" dirty="0" err="1"/>
+              <a:rPr lang="fi-FI" i="1" dirty="0" err="1"/>
               <a:t>get</a:t>
             </a:r>
             <a:r>
-              <a:rPr lang="fi-FI" dirty="0"/>
-              <a:t> </a:t>
-            </a:r>
-            <a:r>
-              <a:rPr lang="fi-FI" dirty="0" err="1"/>
+              <a:rPr lang="fi-FI" i="1" dirty="0"/>
+              <a:t> </a:t>
+            </a:r>
+            <a:r>
+              <a:rPr lang="fi-FI" i="1" dirty="0" err="1"/>
               <a:t>more</a:t>
             </a:r>
             <a:r>
-              <a:rPr lang="fi-FI" dirty="0"/>
-              <a:t> </a:t>
-            </a:r>
-            <a:r>
-              <a:rPr lang="fi-FI" dirty="0" err="1"/>
+              <a:rPr lang="fi-FI" i="1" dirty="0"/>
+              <a:t> </a:t>
+            </a:r>
+            <a:r>
+              <a:rPr lang="fi-FI" i="1" dirty="0" err="1"/>
               <a:t>done</a:t>
             </a:r>
             <a:r>
@@ -7815,11 +7823,11 @@
             <a:pPr lvl="2"/>
             <a:r>
               <a:rPr lang="fi-FI" dirty="0" err="1"/>
-              <a:t>req.query.yourGetQueryParameterHere</a:t>
-            </a:r>
-            <a:r>
-              <a:rPr lang="fi-FI" dirty="0"/>
-              <a:t>   (</a:t>
+              <a:t>req.query.age</a:t>
+            </a:r>
+            <a:r>
+              <a:rPr lang="fi-FI" dirty="0"/>
+              <a:t>      (</a:t>
             </a:r>
             <a:r>
               <a:rPr lang="fi-FI" dirty="0" err="1"/>
@@ -7881,12 +7889,8 @@
           <a:p>
             <a:pPr lvl="2"/>
             <a:r>
-              <a:rPr lang="fi-FI" dirty="0" err="1"/>
-              <a:t>req.params.yourUrlParameterHere</a:t>
-            </a:r>
-            <a:r>
-              <a:rPr lang="fi-FI" dirty="0"/>
-              <a:t>    (</a:t>
+              <a:rPr lang="fi-FI" dirty="0"/>
+              <a:t>req.params.id      (</a:t>
             </a:r>
             <a:r>
               <a:rPr lang="fi-FI" dirty="0" err="1"/>
@@ -7945,7 +7949,14 @@
             </a:r>
             <a:r>
               <a:rPr lang="fi-FI" dirty="0"/>
-              <a:t>       (</a:t>
+              <a:t>       </a:t>
+            </a:r>
+          </a:p>
+          <a:p>
+            <a:pPr lvl="3"/>
+            <a:r>
+              <a:rPr lang="fi-FI" dirty="0"/>
+              <a:t>(</a:t>
             </a:r>
             <a:r>
               <a:rPr lang="fi-FI" dirty="0" err="1"/>
@@ -7965,6 +7976,22 @@
             </a:r>
             <a:r>
               <a:rPr lang="fi-FI" dirty="0" err="1"/>
+              <a:t>returned</a:t>
+            </a:r>
+            <a:r>
+              <a:rPr lang="fi-FI" dirty="0"/>
+              <a:t> </a:t>
+            </a:r>
+            <a:r>
+              <a:rPr lang="fi-FI" dirty="0" err="1"/>
+              <a:t>by</a:t>
+            </a:r>
+            <a:r>
+              <a:rPr lang="fi-FI" dirty="0"/>
+              <a:t> </a:t>
+            </a:r>
+            <a:r>
+              <a:rPr lang="fi-FI" dirty="0" err="1"/>
               <a:t>express.json</a:t>
             </a:r>
             <a:r>
@@ -7981,6 +8008,14 @@
             </a:r>
             <a:r>
               <a:rPr lang="fi-FI" dirty="0" err="1"/>
+              <a:t>already</a:t>
+            </a:r>
+            <a:r>
+              <a:rPr lang="fi-FI" dirty="0"/>
+              <a:t> </a:t>
+            </a:r>
+            <a:r>
+              <a:rPr lang="fi-FI" dirty="0" err="1"/>
               <a:t>parse</a:t>
             </a:r>
             <a:r>
@@ -8038,6 +8073,54 @@
             <a:r>
               <a:rPr lang="fi-FI" dirty="0" err="1"/>
               <a:t>you</a:t>
+            </a:r>
+            <a:r>
+              <a:rPr lang="fi-FI" dirty="0"/>
+              <a:t>. </a:t>
+            </a:r>
+            <a:r>
+              <a:rPr lang="fi-FI" dirty="0" err="1"/>
+              <a:t>Either</a:t>
+            </a:r>
+            <a:r>
+              <a:rPr lang="fi-FI" dirty="0"/>
+              <a:t> a JSON </a:t>
+            </a:r>
+            <a:r>
+              <a:rPr lang="fi-FI" dirty="0" err="1"/>
+              <a:t>array</a:t>
+            </a:r>
+            <a:r>
+              <a:rPr lang="fi-FI" dirty="0"/>
+              <a:t> </a:t>
+            </a:r>
+            <a:r>
+              <a:rPr lang="fi-FI" dirty="0" err="1"/>
+              <a:t>object</a:t>
+            </a:r>
+            <a:r>
+              <a:rPr lang="fi-FI" dirty="0"/>
+              <a:t>, </a:t>
+            </a:r>
+            <a:r>
+              <a:rPr lang="fi-FI" dirty="0" err="1"/>
+              <a:t>or</a:t>
+            </a:r>
+            <a:r>
+              <a:rPr lang="fi-FI" dirty="0"/>
+              <a:t> </a:t>
+            </a:r>
+            <a:r>
+              <a:rPr lang="fi-FI" dirty="0" err="1"/>
+              <a:t>straight</a:t>
+            </a:r>
+            <a:r>
+              <a:rPr lang="fi-FI" dirty="0"/>
+              <a:t> a single JSON </a:t>
+            </a:r>
+            <a:r>
+              <a:rPr lang="fi-FI" dirty="0" err="1"/>
+              <a:t>object</a:t>
             </a:r>
             <a:r>
               <a:rPr lang="fi-FI" dirty="0"/>
@@ -8122,7 +8205,7 @@
           <a:p>
             <a:fld id="{202E1EC2-47B8-044B-A09E-6A63B4D80C87}" type="datetime1">
               <a:rPr lang="fi-FI" smtClean="0"/>
-              <a:t>10.2.2023</a:t>
+              <a:t>23.10.2024</a:t>
             </a:fld>
             <a:endParaRPr lang="en-GB"/>
           </a:p>
@@ -8523,6 +8606,14 @@
             </a:r>
             <a:r>
               <a:rPr lang="fi-FI" dirty="0"/>
+              <a:t> </a:t>
+            </a:r>
+            <a:r>
+              <a:rPr lang="fi-FI" dirty="0" err="1"/>
+              <a:t>actually</a:t>
+            </a:r>
+            <a:r>
+              <a:rPr lang="fi-FI" dirty="0"/>
               <a:t>), and </a:t>
             </a:r>
             <a:r>
@@ -8591,7 +8682,7 @@
             </a:r>
             <a:r>
               <a:rPr lang="fi-FI" dirty="0" err="1"/>
-              <a:t>or</a:t>
+              <a:t>thus</a:t>
             </a:r>
             <a:r>
               <a:rPr lang="fi-FI" dirty="0"/>
@@ -8653,33 +8744,171 @@
               <a:rPr lang="fi-FI" dirty="0"/>
               <a:t>". </a:t>
             </a:r>
+          </a:p>
+          <a:p>
             <a:r>
               <a:rPr lang="fi-FI" dirty="0" err="1"/>
               <a:t>That</a:t>
             </a:r>
             <a:r>
               <a:rPr lang="fi-FI" dirty="0"/>
+              <a:t> is: </a:t>
+            </a:r>
+            <a:r>
+              <a:rPr lang="fi-FI" dirty="0" err="1"/>
+              <a:t>they</a:t>
+            </a:r>
+            <a:r>
+              <a:rPr lang="fi-FI" dirty="0"/>
+              <a:t> </a:t>
+            </a:r>
+            <a:r>
+              <a:rPr lang="fi-FI" dirty="0" err="1"/>
+              <a:t>intervene</a:t>
+            </a:r>
+            <a:r>
+              <a:rPr lang="fi-FI" dirty="0"/>
+              <a:t> in </a:t>
+            </a:r>
+            <a:r>
+              <a:rPr lang="fi-FI" dirty="0" err="1"/>
+              <a:t>the</a:t>
+            </a:r>
+            <a:r>
+              <a:rPr lang="fi-FI" dirty="0"/>
+              <a:t> </a:t>
+            </a:r>
+            <a:r>
+              <a:rPr lang="fi-FI" dirty="0" err="1"/>
+              <a:t>request</a:t>
+            </a:r>
+            <a:r>
+              <a:rPr lang="fi-FI" dirty="0"/>
+              <a:t> </a:t>
+            </a:r>
+            <a:r>
+              <a:rPr lang="fi-FI" dirty="0" err="1"/>
+              <a:t>processing</a:t>
+            </a:r>
+            <a:r>
+              <a:rPr lang="fi-FI" dirty="0"/>
+              <a:t> </a:t>
+            </a:r>
+            <a:r>
+              <a:rPr lang="fi-FI" dirty="0" err="1"/>
+              <a:t>pipeline</a:t>
+            </a:r>
+            <a:r>
+              <a:rPr lang="fi-FI" dirty="0"/>
+              <a:t> for </a:t>
+            </a:r>
+            <a:r>
+              <a:rPr lang="fi-FI" dirty="0" err="1"/>
+              <a:t>each</a:t>
+            </a:r>
+            <a:r>
+              <a:rPr lang="fi-FI" dirty="0"/>
+              <a:t> and </a:t>
+            </a:r>
+            <a:r>
+              <a:rPr lang="fi-FI" dirty="0" err="1"/>
+              <a:t>every</a:t>
+            </a:r>
+            <a:r>
+              <a:rPr lang="fi-FI" dirty="0"/>
+              <a:t> </a:t>
+            </a:r>
+            <a:r>
+              <a:rPr lang="fi-FI" dirty="0" err="1"/>
+              <a:t>request</a:t>
+            </a:r>
+            <a:r>
+              <a:rPr lang="fi-FI" dirty="0"/>
+              <a:t>. </a:t>
+            </a:r>
+            <a:r>
+              <a:rPr lang="fi-FI" dirty="0" err="1"/>
+              <a:t>After</a:t>
+            </a:r>
+            <a:r>
+              <a:rPr lang="fi-FI" dirty="0"/>
+              <a:t> </a:t>
+            </a:r>
+            <a:r>
+              <a:rPr lang="fi-FI" dirty="0" err="1"/>
+              <a:t>all</a:t>
+            </a:r>
+            <a:r>
+              <a:rPr lang="fi-FI" dirty="0"/>
+              <a:t> </a:t>
+            </a:r>
+            <a:r>
+              <a:rPr lang="fi-FI" dirty="0" err="1"/>
+              <a:t>the</a:t>
+            </a:r>
+            <a:r>
+              <a:rPr lang="fi-FI" dirty="0"/>
+              <a:t> </a:t>
+            </a:r>
+            <a:r>
+              <a:rPr lang="fi-FI" dirty="0" err="1"/>
+              <a:t>middleware</a:t>
+            </a:r>
+            <a:r>
+              <a:rPr lang="fi-FI" dirty="0"/>
+              <a:t> </a:t>
+            </a:r>
+            <a:r>
+              <a:rPr lang="fi-FI" dirty="0" err="1"/>
+              <a:t>the</a:t>
+            </a:r>
+            <a:r>
+              <a:rPr lang="fi-FI" dirty="0"/>
+              <a:t> </a:t>
+            </a:r>
+            <a:r>
+              <a:rPr lang="fi-FI" dirty="0" err="1"/>
+              <a:t>last</a:t>
+            </a:r>
+            <a:r>
+              <a:rPr lang="fi-FI" dirty="0"/>
+              <a:t> </a:t>
+            </a:r>
+            <a:r>
+              <a:rPr lang="fi-FI" dirty="0" err="1"/>
+              <a:t>function</a:t>
+            </a:r>
+            <a:r>
+              <a:rPr lang="fi-FI" dirty="0"/>
+              <a:t> to </a:t>
+            </a:r>
+            <a:r>
+              <a:rPr lang="fi-FI" dirty="0" err="1"/>
+              <a:t>be</a:t>
+            </a:r>
+            <a:r>
+              <a:rPr lang="fi-FI" dirty="0"/>
+              <a:t> </a:t>
+            </a:r>
+            <a:r>
+              <a:rPr lang="fi-FI" dirty="0" err="1"/>
+              <a:t>used</a:t>
+            </a:r>
+            <a:r>
+              <a:rPr lang="fi-FI" dirty="0"/>
               <a:t> is </a:t>
             </a:r>
             <a:r>
               <a:rPr lang="fi-FI" dirty="0" err="1"/>
-              <a:t>they</a:t>
-            </a:r>
-            <a:r>
-              <a:rPr lang="fi-FI" dirty="0"/>
-              <a:t> </a:t>
-            </a:r>
-            <a:r>
-              <a:rPr lang="fi-FI" dirty="0" err="1"/>
-              <a:t>intervene</a:t>
-            </a:r>
-            <a:r>
-              <a:rPr lang="fi-FI" dirty="0"/>
-              <a:t> in </a:t>
-            </a:r>
-            <a:r>
-              <a:rPr lang="fi-FI" dirty="0" err="1"/>
-              <a:t>the</a:t>
+              <a:t>your</a:t>
+            </a:r>
+            <a:r>
+              <a:rPr lang="fi-FI" dirty="0"/>
+              <a:t> </a:t>
+            </a:r>
+            <a:r>
+              <a:rPr lang="fi-FI" dirty="0" err="1"/>
+              <a:t>own</a:t>
             </a:r>
             <a:r>
               <a:rPr lang="fi-FI" dirty="0"/>
@@ -8695,135 +8924,23 @@
             </a:r>
             <a:r>
               <a:rPr lang="fi-FI" dirty="0" err="1"/>
-              <a:t>processing</a:t>
-            </a:r>
-            <a:r>
-              <a:rPr lang="fi-FI" dirty="0"/>
-              <a:t> </a:t>
-            </a:r>
-            <a:r>
-              <a:rPr lang="fi-FI" dirty="0" err="1"/>
-              <a:t>pipeline</a:t>
-            </a:r>
-            <a:r>
-              <a:rPr lang="fi-FI" dirty="0"/>
-              <a:t> for </a:t>
-            </a:r>
-            <a:r>
-              <a:rPr lang="fi-FI" dirty="0" err="1"/>
-              <a:t>each</a:t>
-            </a:r>
-            <a:r>
-              <a:rPr lang="fi-FI" dirty="0"/>
-              <a:t> and </a:t>
-            </a:r>
-            <a:r>
-              <a:rPr lang="fi-FI" dirty="0" err="1"/>
-              <a:t>every</a:t>
-            </a:r>
-            <a:r>
-              <a:rPr lang="fi-FI" dirty="0"/>
-              <a:t> </a:t>
-            </a:r>
-            <a:r>
-              <a:rPr lang="fi-FI" dirty="0" err="1"/>
-              <a:t>request</a:t>
-            </a:r>
-            <a:r>
-              <a:rPr lang="fi-FI" dirty="0"/>
-              <a:t>. </a:t>
-            </a:r>
-            <a:r>
-              <a:rPr lang="fi-FI" dirty="0" err="1"/>
-              <a:t>After</a:t>
-            </a:r>
-            <a:r>
-              <a:rPr lang="fi-FI" dirty="0"/>
-              <a:t> </a:t>
-            </a:r>
-            <a:r>
-              <a:rPr lang="fi-FI" dirty="0" err="1"/>
-              <a:t>the</a:t>
-            </a:r>
-            <a:r>
-              <a:rPr lang="fi-FI" dirty="0"/>
-              <a:t> </a:t>
-            </a:r>
-            <a:r>
-              <a:rPr lang="fi-FI" dirty="0" err="1"/>
-              <a:t>middleware</a:t>
-            </a:r>
-            <a:r>
-              <a:rPr lang="fi-FI" dirty="0"/>
-              <a:t> </a:t>
-            </a:r>
-            <a:r>
-              <a:rPr lang="fi-FI" dirty="0" err="1"/>
-              <a:t>the</a:t>
-            </a:r>
-            <a:r>
-              <a:rPr lang="fi-FI" dirty="0"/>
-              <a:t> </a:t>
-            </a:r>
-            <a:r>
-              <a:rPr lang="fi-FI" dirty="0" err="1"/>
-              <a:t>last</a:t>
-            </a:r>
-            <a:r>
-              <a:rPr lang="fi-FI" dirty="0"/>
-              <a:t> </a:t>
-            </a:r>
-            <a:r>
-              <a:rPr lang="fi-FI" dirty="0" err="1"/>
-              <a:t>function</a:t>
-            </a:r>
-            <a:r>
-              <a:rPr lang="fi-FI" dirty="0"/>
-              <a:t> to </a:t>
-            </a:r>
-            <a:r>
-              <a:rPr lang="fi-FI" dirty="0" err="1"/>
-              <a:t>be</a:t>
-            </a:r>
-            <a:r>
-              <a:rPr lang="fi-FI" dirty="0"/>
-              <a:t> </a:t>
-            </a:r>
-            <a:r>
-              <a:rPr lang="fi-FI" dirty="0" err="1"/>
-              <a:t>used</a:t>
-            </a:r>
-            <a:r>
-              <a:rPr lang="fi-FI" dirty="0"/>
-              <a:t> is </a:t>
-            </a:r>
-            <a:r>
-              <a:rPr lang="fi-FI" dirty="0" err="1"/>
-              <a:t>your</a:t>
-            </a:r>
-            <a:r>
-              <a:rPr lang="fi-FI" dirty="0"/>
-              <a:t> </a:t>
-            </a:r>
-            <a:r>
-              <a:rPr lang="fi-FI" dirty="0" err="1"/>
-              <a:t>own</a:t>
-            </a:r>
-            <a:r>
-              <a:rPr lang="fi-FI" dirty="0"/>
-              <a:t> </a:t>
-            </a:r>
-            <a:r>
-              <a:rPr lang="fi-FI" dirty="0" err="1"/>
-              <a:t>request</a:t>
-            </a:r>
-            <a:r>
-              <a:rPr lang="fi-FI" dirty="0"/>
-              <a:t> </a:t>
-            </a:r>
-            <a:r>
-              <a:rPr lang="fi-FI" dirty="0" err="1"/>
               <a:t>handler</a:t>
+            </a:r>
+            <a:r>
+              <a:rPr lang="fi-FI" dirty="0"/>
+              <a:t> </a:t>
+            </a:r>
+            <a:r>
+              <a:rPr lang="fi-FI" dirty="0" err="1"/>
+              <a:t>defined</a:t>
+            </a:r>
+            <a:r>
+              <a:rPr lang="fi-FI" dirty="0"/>
+              <a:t> </a:t>
+            </a:r>
+            <a:r>
+              <a:rPr lang="fi-FI" dirty="0" err="1"/>
+              <a:t>with</a:t>
             </a:r>
             <a:r>
               <a:rPr lang="fi-FI" dirty="0"/>
@@ -9210,7 +9327,7 @@
           <a:p>
             <a:fld id="{202E1EC2-47B8-044B-A09E-6A63B4D80C87}" type="datetime1">
               <a:rPr lang="fi-FI" smtClean="0"/>
-              <a:t>10.2.2023</a:t>
+              <a:t>23.10.2024</a:t>
             </a:fld>
             <a:endParaRPr lang="en-GB"/>
           </a:p>
@@ -9948,7 +10065,7 @@
           <a:p>
             <a:fld id="{202E1EC2-47B8-044B-A09E-6A63B4D80C87}" type="datetime1">
               <a:rPr lang="fi-FI" smtClean="0"/>
-              <a:t>10.2.2023</a:t>
+              <a:t>23.10.2024</a:t>
             </a:fld>
             <a:endParaRPr lang="en-GB"/>
           </a:p>
@@ -10587,6 +10704,15 @@
 </file>
 
 <file path=customXml/item2.xml><?xml version="1.0" encoding="utf-8"?>
+<?mso-contentType ?>
+<FormTemplates xmlns="http://schemas.microsoft.com/sharepoint/v3/contenttype/forms">
+  <Display>DocumentLibraryForm</Display>
+  <Edit>DocumentLibraryForm</Edit>
+  <New>DocumentLibraryForm</New>
+</FormTemplates>
+</file>
+
+<file path=customXml/item3.xml><?xml version="1.0" encoding="utf-8"?>
 <ct:contentTypeSchema xmlns:ct="http://schemas.microsoft.com/office/2006/metadata/contentType" xmlns:ma="http://schemas.microsoft.com/office/2006/metadata/properties/metaAttributes" ct:_="" ma:_="" ma:contentTypeName="Document" ma:contentTypeID="0x01010024C55B41993A414DABB8DD07ACBA0814" ma:contentTypeVersion="1" ma:contentTypeDescription="Create a new document." ma:contentTypeScope="" ma:versionID="3ea0c22b5866975a7b271665de4056c5">
   <xsd:schema xmlns:xsd="http://www.w3.org/2001/XMLSchema" xmlns:xs="http://www.w3.org/2001/XMLSchema" xmlns:p="http://schemas.microsoft.com/office/2006/metadata/properties" xmlns:ns1="http://schemas.microsoft.com/sharepoint/v3" targetNamespace="http://schemas.microsoft.com/office/2006/metadata/properties" ma:root="true" ma:fieldsID="ef2aa9ed40e72a78c3822fc753b43e87" ns1:_="">
     <xsd:import namespace="http://schemas.microsoft.com/sharepoint/v3"/>
@@ -10718,15 +10844,6 @@
 </ct:contentTypeSchema>
 </file>
 
-<file path=customXml/item3.xml><?xml version="1.0" encoding="utf-8"?>
-<?mso-contentType ?>
-<FormTemplates xmlns="http://schemas.microsoft.com/sharepoint/v3/contenttype/forms">
-  <Display>DocumentLibraryForm</Display>
-  <Edit>DocumentLibraryForm</Edit>
-  <New>DocumentLibraryForm</New>
-</FormTemplates>
-</file>
-
 <file path=customXml/itemProps1.xml><?xml version="1.0" encoding="utf-8"?>
 <ds:datastoreItem xmlns:ds="http://schemas.openxmlformats.org/officeDocument/2006/customXml" ds:itemID="{DED4E12E-7268-4B03-A47B-0755D62B5E31}">
   <ds:schemaRefs>
@@ -10744,6 +10861,14 @@
 </file>
 
 <file path=customXml/itemProps2.xml><?xml version="1.0" encoding="utf-8"?>
+<ds:datastoreItem xmlns:ds="http://schemas.openxmlformats.org/officeDocument/2006/customXml" ds:itemID="{D546C03B-CD3A-4EA0-AAA4-0E00E896454E}">
+  <ds:schemaRefs>
+    <ds:schemaRef ds:uri="http://schemas.microsoft.com/sharepoint/v3/contenttype/forms"/>
+  </ds:schemaRefs>
+</ds:datastoreItem>
+</file>
+
+<file path=customXml/itemProps3.xml><?xml version="1.0" encoding="utf-8"?>
 <ds:datastoreItem xmlns:ds="http://schemas.openxmlformats.org/officeDocument/2006/customXml" ds:itemID="{B9E4DC25-62AA-44A0-8D5C-DB44892588AF}">
   <ds:schemaRefs>
     <ds:schemaRef ds:uri="http://schemas.microsoft.com/office/2006/metadata/contentType"/>
@@ -10759,12 +10884,4 @@
     <ds:schemaRef ds:uri="http://schemas.microsoft.com/internal/obd"/>
   </ds:schemaRefs>
 </ds:datastoreItem>
-</file>
-
-<file path=customXml/itemProps3.xml><?xml version="1.0" encoding="utf-8"?>
-<ds:datastoreItem xmlns:ds="http://schemas.openxmlformats.org/officeDocument/2006/customXml" ds:itemID="{D546C03B-CD3A-4EA0-AAA4-0E00E896454E}">
-  <ds:schemaRefs>
-    <ds:schemaRef ds:uri="http://schemas.microsoft.com/sharepoint/v3/contenttype/forms"/>
-  </ds:schemaRefs>
-</ds:datastoreItem>
 </file>
</xml_diff>

<commit_message>
updates to node materials
</commit_message>
<xml_diff>
--- a/05_es6_node/NodeJS_demo/02_nodejs/Express_and_middleware.pptx
+++ b/05_es6_node/NodeJS_demo/02_nodejs/Express_and_middleware.pptx
@@ -1682,7 +1682,7 @@
           <a:p>
             <a:fld id="{5645C365-1C26-6946-87AF-75D6A7DF4277}" type="datetimeFigureOut">
               <a:rPr lang="en-GB" smtClean="0"/>
-              <a:t>23/10/2024</a:t>
+              <a:t>27/02/2025</a:t>
             </a:fld>
             <a:endParaRPr lang="en-GB"/>
           </a:p>
@@ -2181,7 +2181,7 @@
           <a:p>
             <a:fld id="{35B864B8-8D08-7B43-B4FB-B2FB41A5D9E3}" type="datetime1">
               <a:rPr lang="fi-FI" smtClean="0"/>
-              <a:t>23.10.2024</a:t>
+              <a:t>27.2.2025</a:t>
             </a:fld>
             <a:endParaRPr lang="en-GB" dirty="0"/>
           </a:p>
@@ -2508,7 +2508,7 @@
           <a:p>
             <a:fld id="{D5AEA85A-FC56-D34C-9AA6-ECC3D2586F37}" type="datetime1">
               <a:rPr lang="fi-FI" smtClean="0"/>
-              <a:t>23.10.2024</a:t>
+              <a:t>27.2.2025</a:t>
             </a:fld>
             <a:endParaRPr lang="en-GB" dirty="0"/>
           </a:p>
@@ -2718,7 +2718,7 @@
           <a:p>
             <a:fld id="{E6BC6EEF-E660-7844-8930-418AFF95EA40}" type="datetime1">
               <a:rPr lang="fi-FI" smtClean="0"/>
-              <a:t>23.10.2024</a:t>
+              <a:t>27.2.2025</a:t>
             </a:fld>
             <a:endParaRPr lang="en-GB" dirty="0"/>
           </a:p>
@@ -3027,7 +3027,7 @@
           <a:p>
             <a:fld id="{4E10C7EC-C1C1-9849-A573-7692478FCD52}" type="datetime1">
               <a:rPr lang="fi-FI" smtClean="0"/>
-              <a:t>23.10.2024</a:t>
+              <a:t>27.2.2025</a:t>
             </a:fld>
             <a:endParaRPr lang="en-GB" dirty="0"/>
           </a:p>
@@ -3300,7 +3300,7 @@
           <a:p>
             <a:fld id="{844FF3FE-30BE-2040-9151-6FBC4992BF4F}" type="datetime1">
               <a:rPr lang="fi-FI" smtClean="0"/>
-              <a:t>23.10.2024</a:t>
+              <a:t>27.2.2025</a:t>
             </a:fld>
             <a:endParaRPr lang="en-GB" dirty="0"/>
           </a:p>
@@ -3540,7 +3540,7 @@
           <a:p>
             <a:fld id="{11EDCD7B-6966-E249-89F2-D46BDFBF56BE}" type="datetime1">
               <a:rPr lang="fi-FI" smtClean="0"/>
-              <a:t>23.10.2024</a:t>
+              <a:t>27.2.2025</a:t>
             </a:fld>
             <a:endParaRPr lang="en-GB" dirty="0"/>
           </a:p>
@@ -3833,7 +3833,7 @@
           <a:p>
             <a:fld id="{11EDCD7B-6966-E249-89F2-D46BDFBF56BE}" type="datetime1">
               <a:rPr lang="fi-FI" smtClean="0"/>
-              <a:t>23.10.2024</a:t>
+              <a:t>27.2.2025</a:t>
             </a:fld>
             <a:endParaRPr lang="en-GB" dirty="0"/>
           </a:p>
@@ -4272,7 +4272,7 @@
           <a:p>
             <a:fld id="{844FF3FE-30BE-2040-9151-6FBC4992BF4F}" type="datetime1">
               <a:rPr lang="fi-FI" smtClean="0"/>
-              <a:t>23.10.2024</a:t>
+              <a:t>27.2.2025</a:t>
             </a:fld>
             <a:endParaRPr lang="en-GB" dirty="0"/>
           </a:p>
@@ -4500,7 +4500,7 @@
           <a:p>
             <a:fld id="{11EDCD7B-6966-E249-89F2-D46BDFBF56BE}" type="datetime1">
               <a:rPr lang="fi-FI" smtClean="0"/>
-              <a:t>23.10.2024</a:t>
+              <a:t>27.2.2025</a:t>
             </a:fld>
             <a:endParaRPr lang="en-GB" dirty="0"/>
           </a:p>
@@ -4915,7 +4915,7 @@
           <a:p>
             <a:fld id="{B62E192A-D52B-F541-B2AA-4AEB9388F1F7}" type="datetime1">
               <a:rPr lang="fi-FI" smtClean="0"/>
-              <a:t>23.10.2024</a:t>
+              <a:t>27.2.2025</a:t>
             </a:fld>
             <a:endParaRPr lang="en-GB" dirty="0"/>
           </a:p>
@@ -5215,7 +5215,7 @@
           <a:p>
             <a:fld id="{EEA4FAA2-2B3E-264C-A42F-2D6D3EF33A3C}" type="datetime1">
               <a:rPr lang="fi-FI" smtClean="0"/>
-              <a:t>23.10.2024</a:t>
+              <a:t>27.2.2025</a:t>
             </a:fld>
             <a:endParaRPr lang="en-GB" dirty="0"/>
           </a:p>
@@ -6118,7 +6118,7 @@
           <a:p>
             <a:fld id="{B3114A65-8017-1743-A85A-B2A4BB835AE9}" type="datetime1">
               <a:rPr lang="fi-FI" smtClean="0"/>
-              <a:t>23.10.2024</a:t>
+              <a:t>27.2.2025</a:t>
             </a:fld>
             <a:endParaRPr lang="en-GB" dirty="0"/>
           </a:p>
@@ -6346,7 +6346,7 @@
           <a:p>
             <a:fld id="{11EDCD7B-6966-E249-89F2-D46BDFBF56BE}" type="datetime1">
               <a:rPr lang="fi-FI" smtClean="0"/>
-              <a:t>23.10.2024</a:t>
+              <a:t>27.2.2025</a:t>
             </a:fld>
             <a:endParaRPr lang="en-GB" dirty="0"/>
           </a:p>
@@ -6638,7 +6638,7 @@
           <a:p>
             <a:fld id="{45F98643-D206-614D-B596-3C8548138211}" type="datetime1">
               <a:rPr lang="fi-FI" smtClean="0"/>
-              <a:t>23.10.2024</a:t>
+              <a:t>27.2.2025</a:t>
             </a:fld>
             <a:endParaRPr lang="en-GB" dirty="0"/>
           </a:p>
@@ -7283,7 +7283,7 @@
           <a:p>
             <a:fld id="{30BF63A1-919F-FB49-ABA8-182126D24C50}" type="datetime1">
               <a:rPr lang="fi-FI" smtClean="0"/>
-              <a:t>23.10.2024</a:t>
+              <a:t>27.2.2025</a:t>
             </a:fld>
             <a:endParaRPr lang="en-GB" dirty="0"/>
           </a:p>
@@ -8205,7 +8205,7 @@
           <a:p>
             <a:fld id="{202E1EC2-47B8-044B-A09E-6A63B4D80C87}" type="datetime1">
               <a:rPr lang="fi-FI" smtClean="0"/>
-              <a:t>23.10.2024</a:t>
+              <a:t>27.2.2025</a:t>
             </a:fld>
             <a:endParaRPr lang="en-GB"/>
           </a:p>
@@ -9327,7 +9327,7 @@
           <a:p>
             <a:fld id="{202E1EC2-47B8-044B-A09E-6A63B4D80C87}" type="datetime1">
               <a:rPr lang="fi-FI" smtClean="0"/>
-              <a:t>23.10.2024</a:t>
+              <a:t>27.2.2025</a:t>
             </a:fld>
             <a:endParaRPr lang="en-GB"/>
           </a:p>
@@ -9551,15 +9551,15 @@
             </a:r>
             <a:r>
               <a:rPr lang="fi-FI" dirty="0" err="1"/>
-              <a:t>injection</a:t>
-            </a:r>
-            <a:r>
-              <a:rPr lang="fi-FI" dirty="0"/>
-              <a:t> of </a:t>
-            </a:r>
-            <a:r>
-              <a:rPr lang="fi-FI" dirty="0" err="1"/>
-              <a:t>content</a:t>
+              <a:t>connection</a:t>
+            </a:r>
+            <a:r>
+              <a:rPr lang="fi-FI" dirty="0"/>
+              <a:t> </a:t>
+            </a:r>
+            <a:r>
+              <a:rPr lang="fi-FI" dirty="0" err="1"/>
+              <a:t>initiated</a:t>
             </a:r>
             <a:r>
               <a:rPr lang="fi-FI" dirty="0"/>
@@ -9606,6 +9606,14 @@
             <a:r>
               <a:rPr lang="fi-FI" dirty="0"/>
               <a:t> CORS </a:t>
+            </a:r>
+            <a:r>
+              <a:rPr lang="fi-FI" dirty="0" err="1"/>
+              <a:t>backend</a:t>
+            </a:r>
+            <a:r>
+              <a:rPr lang="fi-FI" dirty="0"/>
+              <a:t> </a:t>
             </a:r>
             <a:r>
               <a:rPr lang="fi-FI" dirty="0" err="1"/>
@@ -9969,7 +9977,7 @@
             </a:r>
             <a:r>
               <a:rPr lang="fi-FI" dirty="0" err="1"/>
-              <a:t>whitelists</a:t>
+              <a:t>whitelist</a:t>
             </a:r>
             <a:r>
               <a:rPr lang="fi-FI" dirty="0"/>
@@ -9993,19 +10001,47 @@
             </a:r>
             <a:r>
               <a:rPr lang="fi-FI" dirty="0" err="1"/>
-              <a:t>between</a:t>
-            </a:r>
-            <a:r>
-              <a:rPr lang="fi-FI" dirty="0"/>
-              <a:t> </a:t>
-            </a:r>
-            <a:r>
-              <a:rPr lang="fi-FI" dirty="0" err="1"/>
-              <a:t>servers</a:t>
-            </a:r>
-            <a:r>
-              <a:rPr lang="fi-FI" dirty="0"/>
-              <a:t>, and </a:t>
+              <a:t>from</a:t>
+            </a:r>
+            <a:r>
+              <a:rPr lang="fi-FI" dirty="0"/>
+              <a:t> </a:t>
+            </a:r>
+            <a:r>
+              <a:rPr lang="fi-FI" dirty="0" err="1"/>
+              <a:t>client</a:t>
+            </a:r>
+            <a:r>
+              <a:rPr lang="fi-FI" dirty="0"/>
+              <a:t> (web </a:t>
+            </a:r>
+            <a:r>
+              <a:rPr lang="fi-FI" dirty="0" err="1"/>
+              <a:t>or</a:t>
+            </a:r>
+            <a:r>
+              <a:rPr lang="fi-FI" dirty="0"/>
+              <a:t> </a:t>
+            </a:r>
+            <a:r>
+              <a:rPr lang="fi-FI" dirty="0" err="1"/>
+              <a:t>another</a:t>
+            </a:r>
+            <a:r>
+              <a:rPr lang="fi-FI" dirty="0"/>
+              <a:t> </a:t>
+            </a:r>
+            <a:r>
+              <a:rPr lang="fi-FI" dirty="0" err="1"/>
+              <a:t>server</a:t>
+            </a:r>
+            <a:r>
+              <a:rPr lang="fi-FI"/>
+              <a:t>), </a:t>
+            </a:r>
+            <a:r>
+              <a:rPr lang="fi-FI" dirty="0"/>
+              <a:t>and </a:t>
             </a:r>
             <a:r>
               <a:rPr lang="fi-FI" dirty="0" err="1"/>
@@ -10065,7 +10101,7 @@
           <a:p>
             <a:fld id="{202E1EC2-47B8-044B-A09E-6A63B4D80C87}" type="datetime1">
               <a:rPr lang="fi-FI" smtClean="0"/>
-              <a:t>23.10.2024</a:t>
+              <a:t>27.2.2025</a:t>
             </a:fld>
             <a:endParaRPr lang="en-GB"/>
           </a:p>
@@ -10704,15 +10740,6 @@
 </file>
 
 <file path=customXml/item2.xml><?xml version="1.0" encoding="utf-8"?>
-<?mso-contentType ?>
-<FormTemplates xmlns="http://schemas.microsoft.com/sharepoint/v3/contenttype/forms">
-  <Display>DocumentLibraryForm</Display>
-  <Edit>DocumentLibraryForm</Edit>
-  <New>DocumentLibraryForm</New>
-</FormTemplates>
-</file>
-
-<file path=customXml/item3.xml><?xml version="1.0" encoding="utf-8"?>
 <ct:contentTypeSchema xmlns:ct="http://schemas.microsoft.com/office/2006/metadata/contentType" xmlns:ma="http://schemas.microsoft.com/office/2006/metadata/properties/metaAttributes" ct:_="" ma:_="" ma:contentTypeName="Document" ma:contentTypeID="0x01010024C55B41993A414DABB8DD07ACBA0814" ma:contentTypeVersion="1" ma:contentTypeDescription="Create a new document." ma:contentTypeScope="" ma:versionID="3ea0c22b5866975a7b271665de4056c5">
   <xsd:schema xmlns:xsd="http://www.w3.org/2001/XMLSchema" xmlns:xs="http://www.w3.org/2001/XMLSchema" xmlns:p="http://schemas.microsoft.com/office/2006/metadata/properties" xmlns:ns1="http://schemas.microsoft.com/sharepoint/v3" targetNamespace="http://schemas.microsoft.com/office/2006/metadata/properties" ma:root="true" ma:fieldsID="ef2aa9ed40e72a78c3822fc753b43e87" ns1:_="">
     <xsd:import namespace="http://schemas.microsoft.com/sharepoint/v3"/>
@@ -10844,6 +10871,15 @@
 </ct:contentTypeSchema>
 </file>
 
+<file path=customXml/item3.xml><?xml version="1.0" encoding="utf-8"?>
+<?mso-contentType ?>
+<FormTemplates xmlns="http://schemas.microsoft.com/sharepoint/v3/contenttype/forms">
+  <Display>DocumentLibraryForm</Display>
+  <Edit>DocumentLibraryForm</Edit>
+  <New>DocumentLibraryForm</New>
+</FormTemplates>
+</file>
+
 <file path=customXml/itemProps1.xml><?xml version="1.0" encoding="utf-8"?>
 <ds:datastoreItem xmlns:ds="http://schemas.openxmlformats.org/officeDocument/2006/customXml" ds:itemID="{DED4E12E-7268-4B03-A47B-0755D62B5E31}">
   <ds:schemaRefs>
@@ -10861,14 +10897,6 @@
 </file>
 
 <file path=customXml/itemProps2.xml><?xml version="1.0" encoding="utf-8"?>
-<ds:datastoreItem xmlns:ds="http://schemas.openxmlformats.org/officeDocument/2006/customXml" ds:itemID="{D546C03B-CD3A-4EA0-AAA4-0E00E896454E}">
-  <ds:schemaRefs>
-    <ds:schemaRef ds:uri="http://schemas.microsoft.com/sharepoint/v3/contenttype/forms"/>
-  </ds:schemaRefs>
-</ds:datastoreItem>
-</file>
-
-<file path=customXml/itemProps3.xml><?xml version="1.0" encoding="utf-8"?>
 <ds:datastoreItem xmlns:ds="http://schemas.openxmlformats.org/officeDocument/2006/customXml" ds:itemID="{B9E4DC25-62AA-44A0-8D5C-DB44892588AF}">
   <ds:schemaRefs>
     <ds:schemaRef ds:uri="http://schemas.microsoft.com/office/2006/metadata/contentType"/>
@@ -10884,4 +10912,12 @@
     <ds:schemaRef ds:uri="http://schemas.microsoft.com/internal/obd"/>
   </ds:schemaRefs>
 </ds:datastoreItem>
+</file>
+
+<file path=customXml/itemProps3.xml><?xml version="1.0" encoding="utf-8"?>
+<ds:datastoreItem xmlns:ds="http://schemas.openxmlformats.org/officeDocument/2006/customXml" ds:itemID="{D546C03B-CD3A-4EA0-AAA4-0E00E896454E}">
+  <ds:schemaRefs>
+    <ds:schemaRef ds:uri="http://schemas.microsoft.com/sharepoint/v3/contenttype/forms"/>
+  </ds:schemaRefs>
+</ds:datastoreItem>
 </file>
</xml_diff>